<commit_message>
Reworked Comments and Powerpoint. Fixed errors
</commit_message>
<xml_diff>
--- a/Abgabe/Abschlusspräsentation.pptx
+++ b/Abgabe/Abschlusspräsentation.pptx
@@ -126,6 +126,11 @@
       </a:defRPr>
     </a:lvl9pPr>
   </p:defaultTextStyle>
+  <p:extLst>
+    <p:ext uri="{EFAFB233-063F-42B5-8137-9DF3F51BA10A}">
+      <p15:sldGuideLst xmlns:p15="http://schemas.microsoft.com/office/powerpoint/2012/main"/>
+    </p:ext>
+  </p:extLst>
 </p:presentation>
 </file>
 
@@ -3725,13 +3730,13 @@
           <a:p>
             <a:r>
               <a:rPr lang="de-DE" dirty="0"/>
-              <a:t>Ein klar zu erkennender Trend ist die erhöhte Konzentration von O3 in den Sommermonaten. </a:t>
-            </a:r>
-          </a:p>
-          <a:p>
-            <a:r>
-              <a:rPr lang="de-DE" dirty="0"/>
-              <a:t>Dies kann auf die erhöhe Bildung von O3 im Sommer zurückgeführt werden[2].</a:t>
+              <a:t>Ein klar zu erkennender Trend ist die erhöhte Konzentration von Ozon in den Sommermonaten. </a:t>
+            </a:r>
+          </a:p>
+          <a:p>
+            <a:r>
+              <a:rPr lang="de-DE" dirty="0"/>
+              <a:t>Dies kann auf die erhöhe Bildung von Ozon im Sommer zurückgeführt werden[2].</a:t>
             </a:r>
           </a:p>
         </p:txBody>
@@ -3795,10 +3800,10 @@
       </p:sp>
       <p:pic>
         <p:nvPicPr>
-          <p:cNvPr id="5" name="Grafik 4">
-            <a:extLst>
-              <a:ext uri="{FF2B5EF4-FFF2-40B4-BE49-F238E27FC236}">
-                <a16:creationId xmlns:a16="http://schemas.microsoft.com/office/drawing/2014/main" id="{E700F071-DB8E-4B9F-AD15-988AE932DDA2}"/>
+          <p:cNvPr id="4" name="Grafik 3">
+            <a:extLst>
+              <a:ext uri="{FF2B5EF4-FFF2-40B4-BE49-F238E27FC236}">
+                <a16:creationId xmlns:a16="http://schemas.microsoft.com/office/drawing/2014/main" id="{78603933-2DCC-4537-84A5-67E32104BD1B}"/>
               </a:ext>
             </a:extLst>
           </p:cNvPr>
@@ -3815,8 +3820,8 @@
         </p:blipFill>
         <p:spPr>
           <a:xfrm>
-            <a:off x="1475933" y="3237097"/>
-            <a:ext cx="5204268" cy="3281971"/>
+            <a:off x="2582956" y="3296210"/>
+            <a:ext cx="5143500" cy="3143250"/>
           </a:xfrm>
           <a:prstGeom prst="rect">
             <a:avLst/>
@@ -3989,7 +3994,7 @@
           <a:p>
             <a:r>
               <a:rPr lang="de-DE" dirty="0"/>
-              <a:t>Unter 12°C gibt es keinen Datenpunkt mit einer Konzentration von O3 über</a:t>
+              <a:t>Unter 12°C gibt es keinen Datenpunkt mit einer Konzentration von Ozon über</a:t>
             </a:r>
             <a:r>
               <a:rPr lang="el-GR" dirty="0"/>
@@ -4003,7 +4008,7 @@
           <a:p>
             <a:r>
               <a:rPr lang="de-DE" dirty="0"/>
-              <a:t>Erklären lässt sich dies durch den direkten Zusammenhang zwischen höheren Temperaturen und der O3 Bildungsrate [2]</a:t>
+              <a:t>Erklären lässt sich dies durch den direkten Zusammenhang zwischen höheren Temperaturen und der Ozon Bildungsrate [2]</a:t>
             </a:r>
           </a:p>
         </p:txBody>
@@ -4495,15 +4500,7 @@
           <a:p>
             <a:r>
               <a:rPr lang="de-DE" dirty="0"/>
-              <a:t>Alle Schadstofftypen im Ein-Stunden-Mittelwert für Deutschland (</a:t>
-            </a:r>
-            <a:r>
-              <a:rPr lang="de-DE" dirty="0" err="1"/>
-              <a:t>erklärung</a:t>
-            </a:r>
-            <a:r>
-              <a:rPr lang="de-DE" dirty="0"/>
-              <a:t> hierzu folgt)</a:t>
+              <a:t>Alle Schadstofftypen im Ein-Stunden-Mittelwert für Deutschland (Erklärung hierzu folgt)</a:t>
             </a:r>
           </a:p>
           <a:p>
@@ -4743,7 +4740,7 @@
           <a:p>
             <a:r>
               <a:rPr lang="de-DE" dirty="0"/>
-              <a:t>Das Plotten der durchschnittlichen Ein-Stunden-Mittelwerte der NO2 Konzentration im Tagesdurchschnitt der Vorjahre und der selben Daten aus dem Jahr 2020 sortiert nach Typ</a:t>
+              <a:t>Das Plotten der durchschnittlichen Ein-Stunden-Mittelwerte der NO2-Konzentration im Tagesdurchschnitt der Vorjahre und der selben Daten aus dem Jahr 2020 sortiert nach Typ</a:t>
             </a:r>
           </a:p>
         </p:txBody>
@@ -5478,7 +5475,7 @@
             </a:pPr>
             <a:r>
               <a:rPr lang="de-DE" dirty="0"/>
-              <a:t>Fazit: Der Ein-Stunden-Mittelwert von NO2 ist neben dem Ein-Stunden-Mittelwerte für O3 der einzige Datensatz, der stabil genug ist, um analysiert zu werden. Da O3, wie in Aufgabe 7 f angemerkt, nur wenig unter Menschlichen Einfluss steht, werden für den zweiten Teil unserer Analyse nur Ein-Stunden-Mittelwert von NO2 in Betracht gezogen.</a:t>
+              <a:t>Fazit: Der Ein-Stunden-Mittelwert von NO2 ist neben dem Ein-Stunden-Mittelwerte für Ozon der einzige Datensatz, der stabil genug ist, um analysiert zu werden. Da Ozon, wie in Aufgabe 7 f angemerkt, nur wenig unter Menschlichen Einfluss steht, werden für den zweiten Teil unserer Analyse nur Ein-Stunden-Mittelwert von NO2 in Betracht gezogen.</a:t>
             </a:r>
           </a:p>
         </p:txBody>
@@ -5948,19 +5945,19 @@
           <a:p>
             <a:r>
               <a:rPr lang="de-DE" dirty="0"/>
-              <a:t>Es ist ein Abfall der NO2 Konzentration zu erkennen, als die Ausgangssperre in Kraft getreten ist</a:t>
-            </a:r>
-          </a:p>
-          <a:p>
-            <a:r>
-              <a:rPr lang="de-DE" dirty="0"/>
-              <a:t>Es ist ein Abfall der NO2 Konzentration vom 14.04.2020-19.01.2020 zu erkennen</a:t>
-            </a:r>
-          </a:p>
-          <a:p>
-            <a:r>
-              <a:rPr lang="de-DE" dirty="0"/>
-              <a:t>Der relativ Wert der NO2 Konzentration ist bei Background-Stationen näher an der 100% Marke als bei den Traffic-Stationen</a:t>
+              <a:t>Es ist ein Abfall der NO2-Konzentration zu erkennen, als die Ausgangssperre in Kraft getreten ist</a:t>
+            </a:r>
+          </a:p>
+          <a:p>
+            <a:r>
+              <a:rPr lang="de-DE" dirty="0"/>
+              <a:t>Es ist ein Abfall der NO2-Konzentration vom 14.04.2020-19.01.2020 zu erkennen</a:t>
+            </a:r>
+          </a:p>
+          <a:p>
+            <a:r>
+              <a:rPr lang="de-DE" dirty="0"/>
+              <a:t>Der relativ Wert der NO2-Konzentration ist bei Background-Stationen näher an der 100% Marke als bei den Traffic-Stationen</a:t>
             </a:r>
           </a:p>
         </p:txBody>
@@ -6706,19 +6703,19 @@
           <a:p>
             <a:r>
               <a:rPr lang="de-DE" dirty="0"/>
-              <a:t>Der Beginn der Ausgangssperre hat einen kurzzeitigen Effekt auf die NO2 Konzentration gehabt</a:t>
-            </a:r>
-          </a:p>
-          <a:p>
-            <a:r>
-              <a:rPr lang="de-DE" dirty="0"/>
-              <a:t>Der Graph hält sich seit dem ersten Corona Fall in Deutschland meistens unter der 100% Marke auf, was einen klaren Einfluss der Corona Pandemie auf die NO2 Konzentration zeigt</a:t>
-            </a:r>
-          </a:p>
-          <a:p>
-            <a:r>
-              <a:rPr lang="de-DE" dirty="0"/>
-              <a:t>Die Background-Stationen haben einen höheren relativen Wert zu den Vorjahren als die Traffic-Stationen, was vermuten lässt, dass die Corona Pandemie einen stärkeren Einfluss auf die NO2 Konzentration in Gebieten nahe der Traffic-Stationen hat als nahe der Background-Stationen</a:t>
+              <a:t>Der Beginn der Ausgangssperre hat einen kurzzeitigen Effekt auf die NO2-Konzentration gehabt</a:t>
+            </a:r>
+          </a:p>
+          <a:p>
+            <a:r>
+              <a:rPr lang="de-DE" dirty="0"/>
+              <a:t>Der Graph hält sich seit dem ersten Corona Fall in Deutschland meistens unter der 100% Marke auf, was einen klaren Einfluss der Corona Pandemie auf die NO2-Konzentration zeigt</a:t>
+            </a:r>
+          </a:p>
+          <a:p>
+            <a:r>
+              <a:rPr lang="de-DE" dirty="0"/>
+              <a:t>Die Background-Stationen haben einen höheren relativen Wert zu den Vorjahren als die Traffic-Stationen, was vermuten lässt, dass die Corona Pandemie einen stärkeren Einfluss auf die NO2-Konzentration in Gebieten nahe der Traffic-Stationen hat als nahe der Background-Stationen</a:t>
             </a:r>
           </a:p>
         </p:txBody>
@@ -7942,7 +7939,7 @@
           <a:p>
             <a:r>
               <a:rPr lang="de-DE" dirty="0"/>
-              <a:t>Der höchste gemessene NO2 Wert beträgt 270 </a:t>
+              <a:t>Die höchste gemessene NO2-Konzentration beträgt 270 </a:t>
             </a:r>
             <a:r>
               <a:rPr lang="el-GR" dirty="0"/>
@@ -7956,7 +7953,7 @@
           <a:p>
             <a:r>
               <a:rPr lang="de-DE" dirty="0"/>
-              <a:t>Der Tag mit der höchsten durchschnittlichen NO2 Konzentration war der 23.01.2017 mit 75.72</a:t>
+              <a:t>Der Tag mit der höchsten durchschnittlichen NO2-Konzentration war der 23.01.2017 mit 75.72</a:t>
             </a:r>
             <a:r>
               <a:rPr lang="el-GR" dirty="0"/>
@@ -7966,6 +7963,23 @@
               <a:rPr lang="de-DE" dirty="0"/>
               <a:t>g/m3.</a:t>
             </a:r>
+          </a:p>
+          <a:p>
+            <a:r>
+              <a:rPr lang="de-DE" dirty="0"/>
+              <a:t>Die </a:t>
+            </a:r>
+            <a:r>
+              <a:rPr lang="de-DE" dirty="0" err="1"/>
+              <a:t>Jahrensdurchschnittswerte</a:t>
+            </a:r>
+            <a:r>
+              <a:rPr lang="de-DE" dirty="0"/>
+              <a:t> der NO2-Konzentration seit 2016 fallen bei Traffic-Stationen sichtbar ab</a:t>
+            </a:r>
+          </a:p>
+          <a:p>
+            <a:endParaRPr lang="de-DE" dirty="0"/>
           </a:p>
         </p:txBody>
       </p:sp>
@@ -8026,6 +8040,36 @@
           </a:fontRef>
         </p:style>
       </p:sp>
+      <p:pic>
+        <p:nvPicPr>
+          <p:cNvPr id="4" name="Grafik 3">
+            <a:extLst>
+              <a:ext uri="{FF2B5EF4-FFF2-40B4-BE49-F238E27FC236}">
+                <a16:creationId xmlns:a16="http://schemas.microsoft.com/office/drawing/2014/main" id="{B1090A95-288F-4B64-AF63-97C51D13EDA7}"/>
+              </a:ext>
+            </a:extLst>
+          </p:cNvPr>
+          <p:cNvPicPr>
+            <a:picLocks noChangeAspect="1"/>
+          </p:cNvPicPr>
+          <p:nvPr/>
+        </p:nvPicPr>
+        <p:blipFill>
+          <a:blip r:embed="rId2"/>
+          <a:stretch>
+            <a:fillRect/>
+          </a:stretch>
+        </p:blipFill>
+        <p:spPr>
+          <a:xfrm>
+            <a:off x="7254607" y="3574228"/>
+            <a:ext cx="3178411" cy="3283772"/>
+          </a:xfrm>
+          <a:prstGeom prst="rect">
+            <a:avLst/>
+          </a:prstGeom>
+        </p:spPr>
+      </p:pic>
     </p:spTree>
     <p:extLst>
       <p:ext uri="{BB962C8B-B14F-4D97-AF65-F5344CB8AC3E}">
@@ -8449,19 +8493,19 @@
           <a:p>
             <a:r>
               <a:rPr lang="de-DE" dirty="0"/>
-              <a:t>NO2 Konzentration im Winter ist signifikant höher als die NO2 Konzentration alle anderen Jahreszeiten </a:t>
-            </a:r>
-          </a:p>
-          <a:p>
-            <a:r>
-              <a:rPr lang="de-DE" dirty="0"/>
-              <a:t>NO2 Konzentration im Sommer signifikant niedriger ist als in allen anderen Jahreszeiten</a:t>
-            </a:r>
-          </a:p>
-          <a:p>
-            <a:r>
-              <a:rPr lang="de-DE" dirty="0"/>
-              <a:t>Die hohe NO2 Konzentration ist durch das einsetzten von Gebäudeheizungen im Winter zu erklären[1]. Die Nutzung von Gebäudeheizungen ist zwar auch in den Jahreszeiten Herbst und Frühling vorhanden, aber weniger stark und im Sommer ist die Nutzung von Gebäudeheizungen vernachlässigbar klein.</a:t>
+              <a:t>NO2-Konzentration im Winter ist signifikant höher als die NO2-Konzentration alle anderen Jahreszeiten </a:t>
+            </a:r>
+          </a:p>
+          <a:p>
+            <a:r>
+              <a:rPr lang="de-DE" dirty="0"/>
+              <a:t>NO2-Konzentration im Sommer signifikant niedriger ist als in allen anderen Jahreszeiten</a:t>
+            </a:r>
+          </a:p>
+          <a:p>
+            <a:r>
+              <a:rPr lang="de-DE" dirty="0"/>
+              <a:t>Die hohe NO2-Konzentration ist durch das einsetzten von Gebäudeheizungen im Winter zu erklären[1]. Die Nutzung von Gebäudeheizungen ist zwar auch in den Jahreszeiten Herbst und Frühling vorhanden, aber weniger stark und im Sommer ist die Nutzung von Gebäudeheizungen vernachlässigbar klein.</a:t>
             </a:r>
           </a:p>
         </p:txBody>
@@ -8525,10 +8569,10 @@
       </p:sp>
       <p:pic>
         <p:nvPicPr>
-          <p:cNvPr id="4" name="Grafik 3">
-            <a:extLst>
-              <a:ext uri="{FF2B5EF4-FFF2-40B4-BE49-F238E27FC236}">
-                <a16:creationId xmlns:a16="http://schemas.microsoft.com/office/drawing/2014/main" id="{AB69B0E7-BBF3-456C-A44A-487B639EED7E}"/>
+          <p:cNvPr id="5" name="Grafik 4">
+            <a:extLst>
+              <a:ext uri="{FF2B5EF4-FFF2-40B4-BE49-F238E27FC236}">
+                <a16:creationId xmlns:a16="http://schemas.microsoft.com/office/drawing/2014/main" id="{43050E70-C1D2-4651-8A63-079AC0138E7D}"/>
               </a:ext>
             </a:extLst>
           </p:cNvPr>
@@ -8545,8 +8589,8 @@
         </p:blipFill>
         <p:spPr>
           <a:xfrm>
-            <a:off x="7132873" y="4428861"/>
-            <a:ext cx="3899109" cy="2429139"/>
+            <a:off x="6951849" y="4532499"/>
+            <a:ext cx="3895725" cy="2257425"/>
           </a:xfrm>
           <a:prstGeom prst="rect">
             <a:avLst/>
@@ -8723,7 +8767,7 @@
           <a:p>
             <a:r>
               <a:rPr lang="de-DE" dirty="0"/>
-              <a:t>NO2 Konzentration im Winter ist signifikant höher als die NO2 Konzentration alle anderen Jahreszeiten </a:t>
+              <a:t>NO2 Konzentration im Winter ist signifikant höher als die NO2-Konzentration alle anderen Jahreszeiten </a:t>
             </a:r>
           </a:p>
           <a:p>
@@ -8735,7 +8779,7 @@
           <a:p>
             <a:r>
               <a:rPr lang="de-DE" dirty="0"/>
-              <a:t>Außerdem lässt sich augenscheinlich eine sinkende Volatilität der NO2 Konzentration vermuten </a:t>
+              <a:t>Außerdem lässt sich augenscheinlich eine sinkende Volatilität der NO2-Konzentration vermuten </a:t>
             </a:r>
           </a:p>
         </p:txBody>
@@ -8799,10 +8843,10 @@
       </p:sp>
       <p:pic>
         <p:nvPicPr>
-          <p:cNvPr id="4" name="Grafik 3">
-            <a:extLst>
-              <a:ext uri="{FF2B5EF4-FFF2-40B4-BE49-F238E27FC236}">
-                <a16:creationId xmlns:a16="http://schemas.microsoft.com/office/drawing/2014/main" id="{E7BDF804-C697-4436-8BA3-11194CFE759A}"/>
+          <p:cNvPr id="5" name="Grafik 4">
+            <a:extLst>
+              <a:ext uri="{FF2B5EF4-FFF2-40B4-BE49-F238E27FC236}">
+                <a16:creationId xmlns:a16="http://schemas.microsoft.com/office/drawing/2014/main" id="{139B799B-F4F4-49B6-9E5E-151DA4CBAC99}"/>
               </a:ext>
             </a:extLst>
           </p:cNvPr>
@@ -8819,8 +8863,8 @@
         </p:blipFill>
         <p:spPr>
           <a:xfrm>
-            <a:off x="6096000" y="3429000"/>
-            <a:ext cx="5048250" cy="3429000"/>
+            <a:off x="6033527" y="3514725"/>
+            <a:ext cx="5019675" cy="3257550"/>
           </a:xfrm>
           <a:prstGeom prst="rect">
             <a:avLst/>
@@ -9003,7 +9047,7 @@
             </a:pPr>
             <a:r>
               <a:rPr lang="de-DE" dirty="0"/>
-              <a:t>Freitag Abends und Montag Morgens ist bei allen Typen eine erhöhter Ausstoß zu erkennen</a:t>
+              <a:t>Freitag Abends und Montag Morgens ist bei allen Typen eine erhöhte NO2-Konzentration zu erkennen</a:t>
             </a:r>
           </a:p>
           <a:p>

</xml_diff>

<commit_message>
final work on the ipynb
</commit_message>
<xml_diff>
--- a/Abgabe/Abschlusspräsentation.pptx
+++ b/Abgabe/Abschlusspräsentation.pptx
@@ -328,7 +328,7 @@
           <a:p>
             <a:fld id="{A354F601-7099-46E7-BA5D-13A653821F10}" type="datetimeFigureOut">
               <a:rPr lang="de-DE" smtClean="0"/>
-              <a:t>04.07.2020</a:t>
+              <a:t>05.07.2020</a:t>
             </a:fld>
             <a:endParaRPr lang="de-DE"/>
           </a:p>
@@ -556,7 +556,7 @@
           <a:p>
             <a:fld id="{A354F601-7099-46E7-BA5D-13A653821F10}" type="datetimeFigureOut">
               <a:rPr lang="de-DE" smtClean="0"/>
-              <a:t>04.07.2020</a:t>
+              <a:t>05.07.2020</a:t>
             </a:fld>
             <a:endParaRPr lang="de-DE"/>
           </a:p>
@@ -736,7 +736,7 @@
           <a:p>
             <a:fld id="{A354F601-7099-46E7-BA5D-13A653821F10}" type="datetimeFigureOut">
               <a:rPr lang="de-DE" smtClean="0"/>
-              <a:t>04.07.2020</a:t>
+              <a:t>05.07.2020</a:t>
             </a:fld>
             <a:endParaRPr lang="de-DE"/>
           </a:p>
@@ -906,7 +906,7 @@
           <a:p>
             <a:fld id="{A354F601-7099-46E7-BA5D-13A653821F10}" type="datetimeFigureOut">
               <a:rPr lang="de-DE" smtClean="0"/>
-              <a:t>04.07.2020</a:t>
+              <a:t>05.07.2020</a:t>
             </a:fld>
             <a:endParaRPr lang="de-DE"/>
           </a:p>
@@ -1160,7 +1160,7 @@
           <a:p>
             <a:fld id="{A354F601-7099-46E7-BA5D-13A653821F10}" type="datetimeFigureOut">
               <a:rPr lang="de-DE" smtClean="0"/>
-              <a:t>04.07.2020</a:t>
+              <a:t>05.07.2020</a:t>
             </a:fld>
             <a:endParaRPr lang="de-DE"/>
           </a:p>
@@ -1486,7 +1486,7 @@
           <a:p>
             <a:fld id="{A354F601-7099-46E7-BA5D-13A653821F10}" type="datetimeFigureOut">
               <a:rPr lang="de-DE" smtClean="0"/>
-              <a:t>04.07.2020</a:t>
+              <a:t>05.07.2020</a:t>
             </a:fld>
             <a:endParaRPr lang="de-DE"/>
           </a:p>
@@ -1937,7 +1937,7 @@
           <a:p>
             <a:fld id="{A354F601-7099-46E7-BA5D-13A653821F10}" type="datetimeFigureOut">
               <a:rPr lang="de-DE" smtClean="0"/>
-              <a:t>04.07.2020</a:t>
+              <a:t>05.07.2020</a:t>
             </a:fld>
             <a:endParaRPr lang="de-DE"/>
           </a:p>
@@ -2055,7 +2055,7 @@
           <a:p>
             <a:fld id="{A354F601-7099-46E7-BA5D-13A653821F10}" type="datetimeFigureOut">
               <a:rPr lang="de-DE" smtClean="0"/>
-              <a:t>04.07.2020</a:t>
+              <a:t>05.07.2020</a:t>
             </a:fld>
             <a:endParaRPr lang="de-DE"/>
           </a:p>
@@ -2150,7 +2150,7 @@
           <a:p>
             <a:fld id="{A354F601-7099-46E7-BA5D-13A653821F10}" type="datetimeFigureOut">
               <a:rPr lang="de-DE" smtClean="0"/>
-              <a:t>04.07.2020</a:t>
+              <a:t>05.07.2020</a:t>
             </a:fld>
             <a:endParaRPr lang="de-DE"/>
           </a:p>
@@ -2437,7 +2437,7 @@
           <a:p>
             <a:fld id="{A354F601-7099-46E7-BA5D-13A653821F10}" type="datetimeFigureOut">
               <a:rPr lang="de-DE" smtClean="0"/>
-              <a:t>04.07.2020</a:t>
+              <a:t>05.07.2020</a:t>
             </a:fld>
             <a:endParaRPr lang="de-DE"/>
           </a:p>
@@ -2762,7 +2762,7 @@
           <a:p>
             <a:fld id="{A354F601-7099-46E7-BA5D-13A653821F10}" type="datetimeFigureOut">
               <a:rPr lang="de-DE" smtClean="0"/>
-              <a:t>04.07.2020</a:t>
+              <a:t>05.07.2020</a:t>
             </a:fld>
             <a:endParaRPr lang="de-DE"/>
           </a:p>
@@ -3016,7 +3016,7 @@
           <a:p>
             <a:fld id="{A354F601-7099-46E7-BA5D-13A653821F10}" type="datetimeFigureOut">
               <a:rPr lang="de-DE" smtClean="0"/>
-              <a:t>04.07.2020</a:t>
+              <a:t>05.07.2020</a:t>
             </a:fld>
             <a:endParaRPr lang="de-DE"/>
           </a:p>
@@ -3685,18 +3685,14 @@
         </p:spPr>
         <p:txBody>
           <a:bodyPr>
-            <a:normAutofit/>
+            <a:noAutofit/>
           </a:bodyPr>
           <a:lstStyle/>
           <a:p>
             <a:r>
-              <a:rPr lang="de-DE" sz="2800" dirty="0"/>
+              <a:rPr lang="de-DE" dirty="0"/>
               <a:t>Kurze Vorstellung der Thesen zu den Aufgaben 7 e</a:t>
             </a:r>
-            <a:br>
-              <a:rPr lang="de-DE" sz="2800" dirty="0"/>
-            </a:br>
-            <a:endParaRPr lang="de-DE" sz="2800" dirty="0"/>
           </a:p>
         </p:txBody>
       </p:sp>
@@ -3730,7 +3726,7 @@
           <a:p>
             <a:r>
               <a:rPr lang="de-DE" dirty="0"/>
-              <a:t>Ein klar zu erkennender Trend ist die erhöhte Konzentration von Ozon in den Sommermonaten. </a:t>
+              <a:t>Ein klar zu erkennender Trend ist, die erhöhte Konzentration von Ozon in den Sommermonaten. </a:t>
             </a:r>
           </a:p>
           <a:p>
@@ -3800,10 +3796,10 @@
       </p:sp>
       <p:pic>
         <p:nvPicPr>
-          <p:cNvPr id="4" name="Grafik 3">
-            <a:extLst>
-              <a:ext uri="{FF2B5EF4-FFF2-40B4-BE49-F238E27FC236}">
-                <a16:creationId xmlns:a16="http://schemas.microsoft.com/office/drawing/2014/main" id="{78603933-2DCC-4537-84A5-67E32104BD1B}"/>
+          <p:cNvPr id="6" name="Grafik 5" descr="Ein Bild, das Monitor, Bildschirm, Tisch, sitzend enthält.&#10;&#10;Automatisch generierte Beschreibung">
+            <a:extLst>
+              <a:ext uri="{FF2B5EF4-FFF2-40B4-BE49-F238E27FC236}">
+                <a16:creationId xmlns:a16="http://schemas.microsoft.com/office/drawing/2014/main" id="{A4335D67-4A11-4048-8EA0-D1BD94CFDE35}"/>
               </a:ext>
             </a:extLst>
           </p:cNvPr>
@@ -3813,15 +3809,21 @@
           <p:nvPr/>
         </p:nvPicPr>
         <p:blipFill>
-          <a:blip r:embed="rId2"/>
+          <a:blip r:embed="rId2">
+            <a:extLst>
+              <a:ext uri="{28A0092B-C50C-407E-A947-70E740481C1C}">
+                <a14:useLocalDpi xmlns:a14="http://schemas.microsoft.com/office/drawing/2010/main" val="0"/>
+              </a:ext>
+            </a:extLst>
+          </a:blip>
           <a:stretch>
             <a:fillRect/>
           </a:stretch>
         </p:blipFill>
         <p:spPr>
           <a:xfrm>
-            <a:off x="2582956" y="3296210"/>
-            <a:ext cx="5143500" cy="3143250"/>
+            <a:off x="4055185" y="3429000"/>
+            <a:ext cx="4881282" cy="3254188"/>
           </a:xfrm>
           <a:prstGeom prst="rect">
             <a:avLst/>
@@ -3998,7 +4000,15 @@
             </a:r>
             <a:r>
               <a:rPr lang="el-GR" dirty="0"/>
-              <a:t> μ</a:t>
+              <a:t> </a:t>
+            </a:r>
+            <a:r>
+              <a:rPr lang="de-DE" dirty="0"/>
+              <a:t>100 </a:t>
+            </a:r>
+            <a:r>
+              <a:rPr lang="el-GR" dirty="0"/>
+              <a:t>μ</a:t>
             </a:r>
             <a:r>
               <a:rPr lang="de-DE" dirty="0"/>
@@ -4072,10 +4082,10 @@
       </p:sp>
       <p:pic>
         <p:nvPicPr>
-          <p:cNvPr id="4" name="Grafik 3">
-            <a:extLst>
-              <a:ext uri="{FF2B5EF4-FFF2-40B4-BE49-F238E27FC236}">
-                <a16:creationId xmlns:a16="http://schemas.microsoft.com/office/drawing/2014/main" id="{B807B35E-88FD-4042-B31D-86A798512140}"/>
+          <p:cNvPr id="5" name="Grafik 4">
+            <a:extLst>
+              <a:ext uri="{FF2B5EF4-FFF2-40B4-BE49-F238E27FC236}">
+                <a16:creationId xmlns:a16="http://schemas.microsoft.com/office/drawing/2014/main" id="{DEBDFF5C-A5C3-4482-BBED-AF5B5AA4835E}"/>
               </a:ext>
             </a:extLst>
           </p:cNvPr>
@@ -4092,8 +4102,8 @@
         </p:blipFill>
         <p:spPr>
           <a:xfrm>
-            <a:off x="1364801" y="3224710"/>
-            <a:ext cx="5499550" cy="3449422"/>
+            <a:off x="2830606" y="3243003"/>
+            <a:ext cx="4515850" cy="3513086"/>
           </a:xfrm>
           <a:prstGeom prst="rect">
             <a:avLst/>
@@ -4997,10 +5007,10 @@
       </p:sp>
       <p:pic>
         <p:nvPicPr>
-          <p:cNvPr id="5" name="Grafik 4">
-            <a:extLst>
-              <a:ext uri="{FF2B5EF4-FFF2-40B4-BE49-F238E27FC236}">
-                <a16:creationId xmlns:a16="http://schemas.microsoft.com/office/drawing/2014/main" id="{5290BF6D-3721-4289-A00E-8AE9ADE0F404}"/>
+          <p:cNvPr id="3" name="Grafik 2">
+            <a:extLst>
+              <a:ext uri="{FF2B5EF4-FFF2-40B4-BE49-F238E27FC236}">
+                <a16:creationId xmlns:a16="http://schemas.microsoft.com/office/drawing/2014/main" id="{3EC18B4F-CA97-495F-B78D-0F0DF8EC4B7C}"/>
               </a:ext>
             </a:extLst>
           </p:cNvPr>
@@ -5017,8 +5027,8 @@
         </p:blipFill>
         <p:spPr>
           <a:xfrm>
-            <a:off x="2914649" y="1691322"/>
-            <a:ext cx="5247331" cy="5029825"/>
+            <a:off x="3267004" y="1762347"/>
+            <a:ext cx="5039428" cy="4839375"/>
           </a:xfrm>
           <a:prstGeom prst="rect">
             <a:avLst/>
@@ -5732,10 +5742,10 @@
       </p:sp>
       <p:pic>
         <p:nvPicPr>
-          <p:cNvPr id="4" name="Grafik 3">
-            <a:extLst>
-              <a:ext uri="{FF2B5EF4-FFF2-40B4-BE49-F238E27FC236}">
-                <a16:creationId xmlns:a16="http://schemas.microsoft.com/office/drawing/2014/main" id="{E07B5AC3-F182-4805-9315-E068124972F0}"/>
+          <p:cNvPr id="3" name="Grafik 2">
+            <a:extLst>
+              <a:ext uri="{FF2B5EF4-FFF2-40B4-BE49-F238E27FC236}">
+                <a16:creationId xmlns:a16="http://schemas.microsoft.com/office/drawing/2014/main" id="{B14405B3-35FD-47F1-8B20-F2FF0812A71F}"/>
               </a:ext>
             </a:extLst>
           </p:cNvPr>
@@ -5752,8 +5762,8 @@
         </p:blipFill>
         <p:spPr>
           <a:xfrm>
-            <a:off x="2584450" y="1181100"/>
-            <a:ext cx="5511843" cy="5588000"/>
+            <a:off x="2979406" y="1181100"/>
+            <a:ext cx="4592648" cy="5553635"/>
           </a:xfrm>
           <a:prstGeom prst="rect">
             <a:avLst/>
@@ -7402,22 +7412,13 @@
           <a:p>
             <a:r>
               <a:rPr lang="de-DE" dirty="0"/>
-              <a:t>Die Stationen setzten sich wie folgt zusammen</a:t>
-            </a:r>
-          </a:p>
-          <a:p>
-            <a:r>
-              <a:rPr lang="de-DE" dirty="0"/>
-              <a:t>Die Stationen sind ungefähr gleich verteilt in </a:t>
-            </a:r>
-          </a:p>
-          <a:p>
-            <a:pPr marL="0" indent="0">
-              <a:buNone/>
-            </a:pPr>
-            <a:r>
-              <a:rPr lang="de-DE" dirty="0"/>
-              <a:t>Deutschland</a:t>
+              <a:t>Die Stationen setzten sich wie in der Grafik zu sehen zusammen</a:t>
+            </a:r>
+          </a:p>
+          <a:p>
+            <a:r>
+              <a:rPr lang="de-DE" dirty="0"/>
+              <a:t>Die Stationen sind ungefähr gleich verteilt in Deutschland</a:t>
             </a:r>
           </a:p>
           <a:p>
@@ -7504,7 +7505,7 @@
         </p:blipFill>
         <p:spPr>
           <a:xfrm>
-            <a:off x="6431280" y="1669171"/>
+            <a:off x="9006619" y="1297641"/>
             <a:ext cx="2183217" cy="2131359"/>
           </a:xfrm>
           <a:prstGeom prst="rect">
@@ -7534,7 +7535,7 @@
         </p:blipFill>
         <p:spPr>
           <a:xfrm>
-            <a:off x="3190533" y="3154493"/>
+            <a:off x="1451058" y="3631013"/>
             <a:ext cx="2448267" cy="2772162"/>
           </a:xfrm>
           <a:prstGeom prst="rect">
@@ -7892,7 +7893,7 @@
         </p:nvSpPr>
         <p:spPr>
           <a:xfrm>
-            <a:off x="1261872" y="365760"/>
+            <a:off x="1162669" y="98565"/>
             <a:ext cx="9692640" cy="1325562"/>
           </a:xfrm>
         </p:spPr>
@@ -7927,8 +7928,8 @@
         </p:nvSpPr>
         <p:spPr>
           <a:xfrm>
-            <a:off x="1261872" y="1828800"/>
-            <a:ext cx="8595360" cy="4351337"/>
+            <a:off x="305908" y="1644732"/>
+            <a:ext cx="6148331" cy="4351337"/>
           </a:xfrm>
         </p:spPr>
         <p:txBody>
@@ -8062,7 +8063,7 @@
         </p:blipFill>
         <p:spPr>
           <a:xfrm>
-            <a:off x="7254607" y="3574228"/>
+            <a:off x="7549847" y="1644732"/>
             <a:ext cx="3178411" cy="3283772"/>
           </a:xfrm>
           <a:prstGeom prst="rect">
@@ -8236,7 +8237,7 @@
           <a:p>
             <a:r>
               <a:rPr lang="de-DE" dirty="0"/>
-              <a:t>Die Stationen die das Kriterium für den Stundegrenzwert von 200 </a:t>
+              <a:t>Die Stationen, die das Kriterium für den Stundegrenzwert von 200 </a:t>
             </a:r>
             <a:r>
               <a:rPr lang="el-GR" dirty="0"/>
@@ -8256,7 +8257,7 @@
           <a:p>
             <a:r>
               <a:rPr lang="de-DE" dirty="0"/>
-              <a:t>Auffällig ist hier das keine Station diesen Grenzwert öfter als 18 mal im Jahr überschreitet.</a:t>
+              <a:t>Auffällig ist hier, das keine Station diesen Grenzwert öfter als 18 mal im Jahr überschreitet.</a:t>
             </a:r>
           </a:p>
           <a:p>
@@ -8569,10 +8570,10 @@
       </p:sp>
       <p:pic>
         <p:nvPicPr>
-          <p:cNvPr id="5" name="Grafik 4">
-            <a:extLst>
-              <a:ext uri="{FF2B5EF4-FFF2-40B4-BE49-F238E27FC236}">
-                <a16:creationId xmlns:a16="http://schemas.microsoft.com/office/drawing/2014/main" id="{43050E70-C1D2-4651-8A63-079AC0138E7D}"/>
+          <p:cNvPr id="6" name="Grafik 5" descr="Ein Bild, das sitzend enthält.&#10;&#10;Automatisch generierte Beschreibung">
+            <a:extLst>
+              <a:ext uri="{FF2B5EF4-FFF2-40B4-BE49-F238E27FC236}">
+                <a16:creationId xmlns:a16="http://schemas.microsoft.com/office/drawing/2014/main" id="{DD4B1BA3-388D-4A9E-BBDF-4BD667E88E9D}"/>
               </a:ext>
             </a:extLst>
           </p:cNvPr>
@@ -8582,15 +8583,21 @@
           <p:nvPr/>
         </p:nvPicPr>
         <p:blipFill>
-          <a:blip r:embed="rId2"/>
+          <a:blip r:embed="rId2">
+            <a:extLst>
+              <a:ext uri="{28A0092B-C50C-407E-A947-70E740481C1C}">
+                <a14:useLocalDpi xmlns:a14="http://schemas.microsoft.com/office/drawing/2010/main" val="0"/>
+              </a:ext>
+            </a:extLst>
+          </a:blip>
           <a:stretch>
             <a:fillRect/>
           </a:stretch>
         </p:blipFill>
         <p:spPr>
           <a:xfrm>
-            <a:off x="6951849" y="4532499"/>
-            <a:ext cx="3895725" cy="2257425"/>
+            <a:off x="7185211" y="4545106"/>
+            <a:ext cx="3469341" cy="2312894"/>
           </a:xfrm>
           <a:prstGeom prst="rect">
             <a:avLst/>
@@ -8722,18 +8729,14 @@
         </p:spPr>
         <p:txBody>
           <a:bodyPr>
-            <a:normAutofit/>
+            <a:noAutofit/>
           </a:bodyPr>
           <a:lstStyle/>
           <a:p>
             <a:r>
-              <a:rPr lang="de-DE" sz="3100" dirty="0"/>
+              <a:rPr lang="de-DE" dirty="0"/>
               <a:t>Kurze Vorstellung unserer Thesen zu Aufgabe 5 c</a:t>
             </a:r>
-            <a:br>
-              <a:rPr lang="de-DE" sz="3100" dirty="0"/>
-            </a:br>
-            <a:endParaRPr lang="de-DE" sz="3100" dirty="0"/>
           </a:p>
         </p:txBody>
       </p:sp>
@@ -8843,10 +8846,10 @@
       </p:sp>
       <p:pic>
         <p:nvPicPr>
-          <p:cNvPr id="5" name="Grafik 4">
-            <a:extLst>
-              <a:ext uri="{FF2B5EF4-FFF2-40B4-BE49-F238E27FC236}">
-                <a16:creationId xmlns:a16="http://schemas.microsoft.com/office/drawing/2014/main" id="{139B799B-F4F4-49B6-9E5E-151DA4CBAC99}"/>
+          <p:cNvPr id="6" name="Grafik 5" descr="Ein Bild, das Monitor, dunkel, Bildschirm, sitzend enthält.&#10;&#10;Automatisch generierte Beschreibung">
+            <a:extLst>
+              <a:ext uri="{FF2B5EF4-FFF2-40B4-BE49-F238E27FC236}">
+                <a16:creationId xmlns:a16="http://schemas.microsoft.com/office/drawing/2014/main" id="{9BC8B34A-673E-4660-BE8B-2E4175D9C63C}"/>
               </a:ext>
             </a:extLst>
           </p:cNvPr>
@@ -8856,15 +8859,21 @@
           <p:nvPr/>
         </p:nvPicPr>
         <p:blipFill>
-          <a:blip r:embed="rId2"/>
+          <a:blip r:embed="rId2">
+            <a:extLst>
+              <a:ext uri="{28A0092B-C50C-407E-A947-70E740481C1C}">
+                <a14:useLocalDpi xmlns:a14="http://schemas.microsoft.com/office/drawing/2010/main" val="0"/>
+              </a:ext>
+            </a:extLst>
+          </a:blip>
           <a:stretch>
             <a:fillRect/>
           </a:stretch>
         </p:blipFill>
         <p:spPr>
           <a:xfrm>
-            <a:off x="6033527" y="3514725"/>
-            <a:ext cx="5019675" cy="3257550"/>
+            <a:off x="4948518" y="3824941"/>
+            <a:ext cx="4549588" cy="3033059"/>
           </a:xfrm>
           <a:prstGeom prst="rect">
             <a:avLst/>
@@ -9025,7 +9034,7 @@
         </p:nvSpPr>
         <p:spPr>
           <a:xfrm>
-            <a:off x="0" y="1601054"/>
+            <a:off x="142504" y="1601054"/>
             <a:ext cx="6796278" cy="1953578"/>
           </a:xfrm>
         </p:spPr>
@@ -9047,7 +9056,7 @@
             </a:pPr>
             <a:r>
               <a:rPr lang="de-DE" dirty="0"/>
-              <a:t>Freitag Abends und Montag Morgens ist bei allen Typen eine erhöhte NO2-Konzentration zu erkennen</a:t>
+              <a:t>Freitag Abends und Montag Morgens ist, bei allen Typen, eine erhöhte NO2-Konzentration zu erkennen</a:t>
             </a:r>
           </a:p>
           <a:p>
@@ -9150,7 +9159,7 @@
         </p:nvSpPr>
         <p:spPr>
           <a:xfrm>
-            <a:off x="0" y="3498156"/>
+            <a:off x="142504" y="3444083"/>
             <a:ext cx="5880100" cy="3693319"/>
           </a:xfrm>
           <a:prstGeom prst="rect">
@@ -9250,41 +9259,36 @@
           </a:p>
         </p:txBody>
       </p:sp>
-      <p:sp>
-        <p:nvSpPr>
-          <p:cNvPr id="5" name="Textfeld 4">
-            <a:extLst>
-              <a:ext uri="{FF2B5EF4-FFF2-40B4-BE49-F238E27FC236}">
-                <a16:creationId xmlns:a16="http://schemas.microsoft.com/office/drawing/2014/main" id="{EE342138-CB44-4358-83A3-929C4D0BDBB0}"/>
-              </a:ext>
-            </a:extLst>
-          </p:cNvPr>
-          <p:cNvSpPr txBox="1"/>
+      <p:pic>
+        <p:nvPicPr>
+          <p:cNvPr id="5" name="Grafik 4">
+            <a:extLst>
+              <a:ext uri="{FF2B5EF4-FFF2-40B4-BE49-F238E27FC236}">
+                <a16:creationId xmlns:a16="http://schemas.microsoft.com/office/drawing/2014/main" id="{611EE8FB-8F39-4542-BBB5-C545C4F3F16F}"/>
+              </a:ext>
+            </a:extLst>
+          </p:cNvPr>
+          <p:cNvPicPr>
+            <a:picLocks noChangeAspect="1"/>
+          </p:cNvPicPr>
           <p:nvPr/>
-        </p:nvSpPr>
-        <p:spPr>
-          <a:xfrm>
-            <a:off x="7194550" y="1428750"/>
-            <a:ext cx="3067050" cy="646331"/>
+        </p:nvPicPr>
+        <p:blipFill>
+          <a:blip r:embed="rId2"/>
+          <a:stretch>
+            <a:fillRect/>
+          </a:stretch>
+        </p:blipFill>
+        <p:spPr>
+          <a:xfrm>
+            <a:off x="6656120" y="4305855"/>
+            <a:ext cx="4487740" cy="1969774"/>
           </a:xfrm>
           <a:prstGeom prst="rect">
             <a:avLst/>
           </a:prstGeom>
-          <a:noFill/>
-        </p:spPr>
-        <p:txBody>
-          <a:bodyPr wrap="square" rtlCol="0">
-            <a:spAutoFit/>
-          </a:bodyPr>
-          <a:lstStyle/>
-          <a:p>
-            <a:r>
-              <a:rPr lang="de-DE" dirty="0"/>
-              <a:t>TODO: GRAPH EINFÜGEN</a:t>
-            </a:r>
-          </a:p>
-        </p:txBody>
-      </p:sp>
+        </p:spPr>
+      </p:pic>
     </p:spTree>
     <p:extLst>
       <p:ext uri="{BB962C8B-B14F-4D97-AF65-F5344CB8AC3E}">

</xml_diff>